<commit_message>
stubbing a little more
</commit_message>
<xml_diff>
--- a/05-ML_kaggle/slides.pptx
+++ b/05-ML_kaggle/slides.pptx
@@ -25473,7 +25473,7 @@
         <p:spPr>
           <a:xfrm>
             <a:off x="591183" y="1057513"/>
-            <a:ext cx="2775697" cy="553998"/>
+            <a:ext cx="2929007" cy="1477328"/>
           </a:xfrm>
           <a:prstGeom prst="rect">
             <a:avLst/>
@@ -25492,7 +25492,27 @@
                 <a:latin typeface="PFDinTextCompPro-Italic"/>
                 <a:cs typeface="PFDinTextCompPro-Italic"/>
               </a:rPr>
-              <a:t>For categorical labels:</a:t>
+              <a:t>For categorical labels</a:t>
+            </a:r>
+          </a:p>
+          <a:p>
+            <a:pPr algn="l"/>
+            <a:r>
+              <a:rPr lang="en-US" sz="3000" dirty="0" smtClean="0">
+                <a:latin typeface="PFDinTextCompPro-Italic"/>
+                <a:cs typeface="PFDinTextCompPro-Italic"/>
+              </a:rPr>
+              <a:t>For rankings/scorings</a:t>
+            </a:r>
+          </a:p>
+          <a:p>
+            <a:pPr algn="l"/>
+            <a:r>
+              <a:rPr lang="en-US" sz="3000" dirty="0" smtClean="0">
+                <a:latin typeface="PFDinTextCompPro-Italic"/>
+                <a:cs typeface="PFDinTextCompPro-Italic"/>
+              </a:rPr>
+              <a:t>For numeric predictions</a:t>
             </a:r>
             <a:endParaRPr lang="en-US" sz="3000" dirty="0" smtClean="0">
               <a:latin typeface="PFDinTextCompPro-Italic"/>
@@ -29522,7 +29542,7 @@
         <p:spPr>
           <a:xfrm>
             <a:off x="591183" y="1057513"/>
-            <a:ext cx="6303889" cy="553998"/>
+            <a:ext cx="785592" cy="553998"/>
           </a:xfrm>
           <a:prstGeom prst="rect">
             <a:avLst/>
@@ -29541,8 +29561,12 @@
                 <a:latin typeface="PFDinTextCompPro-Italic"/>
                 <a:cs typeface="PFDinTextCompPro-Italic"/>
               </a:rPr>
-              <a:t>Q: What steps does a classification problem require?</a:t>
-            </a:r>
+              <a:t>more</a:t>
+            </a:r>
+            <a:endParaRPr lang="en-US" sz="3000" dirty="0" smtClean="0">
+              <a:latin typeface="PFDinTextCompPro-Italic"/>
+              <a:cs typeface="PFDinTextCompPro-Italic"/>
+            </a:endParaRPr>
           </a:p>
         </p:txBody>
       </p:sp>

</xml_diff>